<commit_message>
Built site for gh-pages
</commit_message>
<xml_diff>
--- a/posts/2024/AI/Bayes.pptx
+++ b/posts/2024/AI/Bayes.pptx
@@ -3576,8 +3576,8 @@
                     <m:d>
                       <m:dPr>
                         <m:begChr m:val="("/>
+                        <m:sepChr m:val=""/>
                         <m:endChr m:val=")"/>
-                        <m:sepChr m:val=""/>
                         <m:grow/>
                       </m:dPr>
                       <m:e>
@@ -3644,8 +3644,8 @@
                       <m:d>
                         <m:dPr>
                           <m:begChr m:val="{"/>
+                          <m:sepChr m:val=""/>
                           <m:endChr m:val=""/>
-                          <m:sepChr m:val=""/>
                           <m:grow/>
                         </m:dPr>
                         <m:e>
@@ -3799,8 +3799,8 @@
                     <m:d>
                       <m:dPr>
                         <m:begChr m:val="("/>
+                        <m:sepChr m:val=""/>
                         <m:endChr m:val=")"/>
-                        <m:sepChr m:val=""/>
                         <m:grow/>
                       </m:dPr>
                       <m:e>
@@ -3827,8 +3827,8 @@
                     <m:d>
                       <m:dPr>
                         <m:begChr m:val="["/>
+                        <m:sepChr m:val=""/>
                         <m:endChr m:val="]"/>
-                        <m:sepChr m:val=""/>
                         <m:grow/>
                       </m:dPr>
                       <m:e>
@@ -3916,8 +3916,8 @@
                     <m:d>
                       <m:dPr>
                         <m:begChr m:val="("/>
+                        <m:sepChr m:val=""/>
                         <m:endChr m:val=")"/>
-                        <m:sepChr m:val=""/>
                         <m:grow/>
                       </m:dPr>
                       <m:e>
@@ -3949,8 +3949,8 @@
                     <m:d>
                       <m:dPr>
                         <m:begChr m:val="("/>
+                        <m:sepChr m:val=""/>
                         <m:endChr m:val=")"/>
-                        <m:sepChr m:val=""/>
                         <m:grow/>
                       </m:dPr>
                       <m:e>
@@ -4173,8 +4173,8 @@
                       <m:d>
                         <m:dPr>
                           <m:begChr m:val="["/>
+                          <m:sepChr m:val=""/>
                           <m:endChr m:val="]"/>
-                          <m:sepChr m:val=""/>
                           <m:grow/>
                         </m:dPr>
                         <m:e>
@@ -4184,8 +4184,8 @@
                           <m:d>
                             <m:dPr>
                               <m:begChr m:val="("/>
+                              <m:sepChr m:val=""/>
                               <m:endChr m:val=")"/>
-                              <m:sepChr m:val=""/>
                               <m:grow/>
                             </m:dPr>
                             <m:e>
@@ -4212,8 +4212,8 @@
                       <m:d>
                         <m:dPr>
                           <m:begChr m:val="("/>
+                          <m:sepChr m:val=""/>
                           <m:endChr m:val=")"/>
-                          <m:sepChr m:val=""/>
                           <m:grow/>
                         </m:dPr>
                         <m:e>
@@ -4263,8 +4263,8 @@
                           <m:d>
                             <m:dPr>
                               <m:begChr m:val="("/>
+                              <m:sepChr m:val=""/>
                               <m:endChr m:val=")"/>
-                              <m:sepChr m:val=""/>
                               <m:grow/>
                             </m:dPr>
                             <m:e>
@@ -4279,8 +4279,8 @@
                           <m:d>
                             <m:dPr>
                               <m:begChr m:val="("/>
+                              <m:sepChr m:val=""/>
                               <m:endChr m:val=")"/>
-                              <m:sepChr m:val=""/>
                               <m:grow/>
                             </m:dPr>
                             <m:e>
@@ -4316,8 +4316,8 @@
                           <m:d>
                             <m:dPr>
                               <m:begChr m:val="("/>
+                              <m:sepChr m:val=""/>
                               <m:endChr m:val=")"/>
-                              <m:sepChr m:val=""/>
                               <m:grow/>
                             </m:dPr>
                             <m:e>
@@ -4361,8 +4361,8 @@
                           <m:d>
                             <m:dPr>
                               <m:begChr m:val="("/>
+                              <m:sepChr m:val=""/>
                               <m:endChr m:val=")"/>
-                              <m:sepChr m:val=""/>
                               <m:grow/>
                             </m:dPr>
                             <m:e>
@@ -4398,8 +4398,8 @@
                           <m:d>
                             <m:dPr>
                               <m:begChr m:val="("/>
+                              <m:sepChr m:val=""/>
                               <m:endChr m:val=")"/>
-                              <m:sepChr m:val=""/>
                               <m:grow/>
                             </m:dPr>
                             <m:e>
@@ -4461,8 +4461,8 @@
                       <m:d>
                         <m:dPr>
                           <m:begChr m:val="("/>
+                          <m:sepChr m:val=""/>
                           <m:endChr m:val=")"/>
-                          <m:sepChr m:val=""/>
                           <m:grow/>
                         </m:dPr>
                         <m:e>
@@ -4497,8 +4497,8 @@
                           <m:d>
                             <m:dPr>
                               <m:begChr m:val="("/>
+                              <m:sepChr m:val=""/>
                               <m:endChr m:val=")"/>
-                              <m:sepChr m:val=""/>
                               <m:grow/>
                             </m:dPr>
                             <m:e>
@@ -4522,8 +4522,8 @@
                           <m:d>
                             <m:dPr>
                               <m:begChr m:val="("/>
+                              <m:sepChr m:val=""/>
                               <m:endChr m:val=")"/>
-                              <m:sepChr m:val=""/>
                               <m:grow/>
                             </m:dPr>
                             <m:e>
@@ -4560,8 +4560,8 @@
                           <m:d>
                             <m:dPr>
                               <m:begChr m:val="("/>
+                              <m:sepChr m:val=""/>
                               <m:endChr m:val=")"/>
-                              <m:sepChr m:val=""/>
                               <m:grow/>
                             </m:dPr>
                             <m:e>
@@ -4585,8 +4585,8 @@
                           <m:d>
                             <m:dPr>
                               <m:begChr m:val="("/>
+                              <m:sepChr m:val=""/>
                               <m:endChr m:val=")"/>
-                              <m:sepChr m:val=""/>
                               <m:grow/>
                             </m:dPr>
                             <m:e>
@@ -4632,8 +4632,8 @@
                     <m:d>
                       <m:dPr>
                         <m:begChr m:val="("/>
+                        <m:sepChr m:val=""/>
                         <m:endChr m:val=")"/>
-                        <m:sepChr m:val=""/>
                         <m:grow/>
                       </m:dPr>
                       <m:e>
@@ -4729,8 +4729,8 @@
                     <m:d>
                       <m:dPr>
                         <m:begChr m:val="("/>
+                        <m:sepChr m:val=""/>
                         <m:endChr m:val=")"/>
-                        <m:sepChr m:val=""/>
                         <m:grow/>
                       </m:dPr>
                       <m:e>
@@ -4788,8 +4788,8 @@
                     <m:d>
                       <m:dPr>
                         <m:begChr m:val="("/>
+                        <m:sepChr m:val=""/>
                         <m:endChr m:val=")"/>
-                        <m:sepChr m:val=""/>
                         <m:grow/>
                       </m:dPr>
                       <m:e>
@@ -4851,8 +4851,8 @@
                       <m:d>
                         <m:dPr>
                           <m:begChr m:val="("/>
+                          <m:sepChr m:val=""/>
                           <m:endChr m:val=")"/>
-                          <m:sepChr m:val=""/>
                           <m:grow/>
                         </m:dPr>
                         <m:e>
@@ -4900,8 +4900,8 @@
                       <m:d>
                         <m:dPr>
                           <m:begChr m:val="("/>
+                          <m:sepChr m:val=""/>
                           <m:endChr m:val=")"/>
-                          <m:sepChr m:val=""/>
                           <m:grow/>
                         </m:dPr>
                         <m:e>
@@ -4911,8 +4911,8 @@
                           <m:d>
                             <m:dPr>
                               <m:begChr m:val="("/>
+                              <m:sepChr m:val=""/>
                               <m:endChr m:val=")"/>
-                              <m:sepChr m:val=""/>
                               <m:grow/>
                             </m:dPr>
                             <m:e>
@@ -4932,8 +4932,8 @@
                       <m:d>
                         <m:dPr>
                           <m:begChr m:val="("/>
+                          <m:sepChr m:val=""/>
                           <m:endChr m:val=")"/>
-                          <m:sepChr m:val=""/>
                           <m:grow/>
                         </m:dPr>
                         <m:e>
@@ -5002,8 +5002,8 @@
                       <m:d>
                         <m:dPr>
                           <m:begChr m:val="["/>
+                          <m:sepChr m:val=""/>
                           <m:endChr m:val="]"/>
-                          <m:sepChr m:val=""/>
                           <m:grow/>
                         </m:dPr>
                         <m:e>
@@ -5013,8 +5013,8 @@
                           <m:d>
                             <m:dPr>
                               <m:begChr m:val="("/>
+                              <m:sepChr m:val=""/>
                               <m:endChr m:val=")"/>
-                              <m:sepChr m:val=""/>
                               <m:grow/>
                             </m:dPr>
                             <m:e>
@@ -5100,8 +5100,8 @@
                     <m:d>
                       <m:dPr>
                         <m:begChr m:val="["/>
+                        <m:sepChr m:val=""/>
                         <m:endChr m:val="]"/>
-                        <m:sepChr m:val=""/>
                         <m:grow/>
                       </m:dPr>
                       <m:e>
@@ -5130,8 +5130,8 @@
                     <m:d>
                       <m:dPr>
                         <m:begChr m:val="("/>
+                        <m:sepChr m:val=""/>
                         <m:endChr m:val=")"/>
-                        <m:sepChr m:val=""/>
                         <m:grow/>
                       </m:dPr>
                       <m:e>
@@ -5201,8 +5201,8 @@
                       <m:d>
                         <m:dPr>
                           <m:begChr m:val="["/>
+                          <m:sepChr m:val=""/>
                           <m:endChr m:val="]"/>
-                          <m:sepChr m:val=""/>
                           <m:grow/>
                         </m:dPr>
                         <m:e>
@@ -5261,8 +5261,8 @@
                       <m:d>
                         <m:dPr>
                           <m:begChr m:val="("/>
+                          <m:sepChr m:val=""/>
                           <m:endChr m:val=")"/>
-                          <m:sepChr m:val=""/>
                           <m:grow/>
                         </m:dPr>
                         <m:e>
@@ -5286,8 +5286,8 @@
                       <m:d>
                         <m:dPr>
                           <m:begChr m:val="("/>
+                          <m:sepChr m:val=""/>
                           <m:endChr m:val=")"/>
-                          <m:sepChr m:val=""/>
                           <m:grow/>
                         </m:dPr>
                         <m:e>
@@ -5358,8 +5358,8 @@
                             <m:d>
                               <m:dPr>
                                 <m:begChr m:val="["/>
+                                <m:sepChr m:val=""/>
                                 <m:endChr m:val="]"/>
-                                <m:sepChr m:val=""/>
                                 <m:grow/>
                               </m:dPr>
                               <m:e>
@@ -5409,8 +5409,8 @@
                             <m:d>
                               <m:dPr>
                                 <m:begChr m:val="["/>
+                                <m:sepChr m:val=""/>
                                 <m:endChr m:val="]"/>
-                                <m:sepChr m:val=""/>
                                 <m:grow/>
                               </m:dPr>
                               <m:e>
@@ -5455,8 +5455,8 @@
                             <m:d>
                               <m:dPr>
                                 <m:begChr m:val="("/>
+                                <m:sepChr m:val=""/>
                                 <m:endChr m:val=")"/>
-                                <m:sepChr m:val=""/>
                                 <m:grow/>
                               </m:dPr>
                               <m:e>
@@ -5529,8 +5529,8 @@
                             <m:d>
                               <m:dPr>
                                 <m:begChr m:val="("/>
+                                <m:sepChr m:val=""/>
                                 <m:endChr m:val=")"/>
-                                <m:sepChr m:val=""/>
                                 <m:grow/>
                               </m:dPr>
                               <m:e>
@@ -5566,8 +5566,8 @@
                             <m:d>
                               <m:dPr>
                                 <m:begChr m:val="("/>
+                                <m:sepChr m:val=""/>
                                 <m:endChr m:val=")"/>
-                                <m:sepChr m:val=""/>
                                 <m:grow/>
                               </m:dPr>
                               <m:e>
@@ -5585,8 +5585,8 @@
                             <m:d>
                               <m:dPr>
                                 <m:begChr m:val="("/>
+                                <m:sepChr m:val=""/>
                                 <m:endChr m:val=")"/>
-                                <m:sepChr m:val=""/>
                                 <m:grow/>
                               </m:dPr>
                               <m:e>
@@ -5645,8 +5645,8 @@
                             <m:d>
                               <m:dPr>
                                 <m:begChr m:val="["/>
+                                <m:sepChr m:val=""/>
                                 <m:endChr m:val="]"/>
-                                <m:sepChr m:val=""/>
                                 <m:grow/>
                               </m:dPr>
                               <m:e>
@@ -5672,8 +5672,8 @@
                             <m:d>
                               <m:dPr>
                                 <m:begChr m:val="["/>
+                                <m:sepChr m:val=""/>
                                 <m:endChr m:val="]"/>
-                                <m:sepChr m:val=""/>
                                 <m:grow/>
                               </m:dPr>
                               <m:e>
@@ -5683,8 +5683,8 @@
                                 <m:d>
                                   <m:dPr>
                                     <m:begChr m:val="("/>
+                                    <m:sepChr m:val=""/>
                                     <m:endChr m:val=")"/>
-                                    <m:sepChr m:val=""/>
                                     <m:grow/>
                                   </m:dPr>
                                   <m:e>
@@ -5702,8 +5702,8 @@
                                 <m:d>
                                   <m:dPr>
                                     <m:begChr m:val="["/>
+                                    <m:sepChr m:val=""/>
                                     <m:endChr m:val="]"/>
-                                    <m:sepChr m:val=""/>
                                     <m:grow/>
                                   </m:dPr>
                                   <m:e>
@@ -5731,8 +5731,8 @@
                                     <m:d>
                                       <m:dPr>
                                         <m:begChr m:val="["/>
+                                        <m:sepChr m:val=""/>
                                         <m:endChr m:val="]"/>
-                                        <m:sepChr m:val=""/>
                                         <m:grow/>
                                       </m:dPr>
                                       <m:e>
@@ -5786,8 +5786,8 @@
                             <m:d>
                               <m:dPr>
                                 <m:begChr m:val="("/>
+                                <m:sepChr m:val=""/>
                                 <m:endChr m:val=")"/>
-                                <m:sepChr m:val=""/>
                                 <m:grow/>
                               </m:dPr>
                               <m:e>
@@ -5805,8 +5805,8 @@
                             <m:d>
                               <m:dPr>
                                 <m:begChr m:val="["/>
+                                <m:sepChr m:val=""/>
                                 <m:endChr m:val="]"/>
-                                <m:sepChr m:val=""/>
                                 <m:grow/>
                               </m:dPr>
                               <m:e>
@@ -5851,8 +5851,8 @@
                             <m:d>
                               <m:dPr>
                                 <m:begChr m:val="("/>
+                                <m:sepChr m:val=""/>
                                 <m:endChr m:val=")"/>
-                                <m:sepChr m:val=""/>
                                 <m:grow/>
                               </m:dPr>
                               <m:e>
@@ -5925,8 +5925,8 @@
                             <m:d>
                               <m:dPr>
                                 <m:begChr m:val="("/>
+                                <m:sepChr m:val=""/>
                                 <m:endChr m:val=")"/>
-                                <m:sepChr m:val=""/>
                                 <m:grow/>
                               </m:dPr>
                               <m:e>
@@ -5941,8 +5941,8 @@
                             <m:d>
                               <m:dPr>
                                 <m:begChr m:val="("/>
+                                <m:sepChr m:val=""/>
                                 <m:endChr m:val=")"/>
-                                <m:sepChr m:val=""/>
                                 <m:grow/>
                               </m:dPr>
                               <m:e>
@@ -5978,8 +5978,8 @@
                             <m:d>
                               <m:dPr>
                                 <m:begChr m:val="("/>
+                                <m:sepChr m:val=""/>
                                 <m:endChr m:val=")"/>
-                                <m:sepChr m:val=""/>
                                 <m:grow/>
                               </m:dPr>
                               <m:e>
@@ -5997,8 +5997,8 @@
                             <m:d>
                               <m:dPr>
                                 <m:begChr m:val="("/>
+                                <m:sepChr m:val=""/>
                                 <m:endChr m:val=")"/>
-                                <m:sepChr m:val=""/>
                                 <m:grow/>
                               </m:dPr>
                               <m:e>
@@ -6300,8 +6300,8 @@
                       <m:d>
                         <m:dPr>
                           <m:begChr m:val="("/>
+                          <m:sepChr m:val=""/>
                           <m:endChr m:val=")"/>
-                          <m:sepChr m:val=""/>
                           <m:grow/>
                         </m:dPr>
                         <m:e>
@@ -6336,8 +6336,8 @@
                           <m:d>
                             <m:dPr>
                               <m:begChr m:val="("/>
+                              <m:sepChr m:val=""/>
                               <m:endChr m:val=")"/>
-                              <m:sepChr m:val=""/>
                               <m:grow/>
                             </m:dPr>
                             <m:e>
@@ -6361,8 +6361,8 @@
                           <m:d>
                             <m:dPr>
                               <m:begChr m:val="("/>
+                              <m:sepChr m:val=""/>
                               <m:endChr m:val=")"/>
-                              <m:sepChr m:val=""/>
                               <m:grow/>
                             </m:dPr>
                             <m:e>
@@ -6399,8 +6399,8 @@
                           <m:d>
                             <m:dPr>
                               <m:begChr m:val="("/>
+                              <m:sepChr m:val=""/>
                               <m:endChr m:val=")"/>
-                              <m:sepChr m:val=""/>
                               <m:grow/>
                             </m:dPr>
                             <m:e>
@@ -6424,8 +6424,8 @@
                           <m:d>
                             <m:dPr>
                               <m:begChr m:val="("/>
+                              <m:sepChr m:val=""/>
                               <m:endChr m:val=")"/>
-                              <m:sepChr m:val=""/>
                               <m:grow/>
                             </m:dPr>
                             <m:e>
@@ -6523,8 +6523,8 @@
                     <m:d>
                       <m:dPr>
                         <m:begChr m:val="("/>
+                        <m:sepChr m:val=""/>
                         <m:endChr m:val=")"/>
-                        <m:sepChr m:val=""/>
                         <m:grow/>
                       </m:dPr>
                       <m:e>
@@ -6554,8 +6554,8 @@
                     <m:d>
                       <m:dPr>
                         <m:begChr m:val="("/>
+                        <m:sepChr m:val=""/>
                         <m:endChr m:val=")"/>
-                        <m:sepChr m:val=""/>
                         <m:grow/>
                       </m:dPr>
                       <m:e>
@@ -6607,8 +6607,8 @@
                       <m:d>
                         <m:dPr>
                           <m:begChr m:val="("/>
+                          <m:sepChr m:val=""/>
                           <m:endChr m:val=")"/>
-                          <m:sepChr m:val=""/>
                           <m:grow/>
                         </m:dPr>
                         <m:e>
@@ -6632,8 +6632,8 @@
                       <m:d>
                         <m:dPr>
                           <m:begChr m:val="("/>
+                          <m:sepChr m:val=""/>
                           <m:endChr m:val=")"/>
-                          <m:sepChr m:val=""/>
                           <m:grow/>
                         </m:dPr>
                         <m:e>

</xml_diff>